<commit_message>
2 slide frontend backend
</commit_message>
<xml_diff>
--- a/internetna klepetalnica.pptx
+++ b/internetna klepetalnica.pptx
@@ -10,7 +10,8 @@
     <p:sldId id="261" r:id="rId4"/>
     <p:sldId id="257" r:id="rId5"/>
     <p:sldId id="260" r:id="rId6"/>
-    <p:sldId id="259" r:id="rId7"/>
+    <p:sldId id="262" r:id="rId7"/>
+    <p:sldId id="259" r:id="rId8"/>
   </p:sldIdLst>
   <p:sldSz cx="12192000" cy="6858000"/>
   <p:notesSz cx="6858000" cy="9144000"/>
@@ -1276,664 +1277,6 @@
       <dsp:cNvGrpSpPr/>
     </dsp:nvGrpSpPr>
     <dsp:grpSpPr/>
-    <dsp:sp modelId="{D163E0B1-4BB0-4EB2-A482-CB5DCF8587C4}">
-      <dsp:nvSpPr>
-        <dsp:cNvPr id="0" name=""/>
-        <dsp:cNvSpPr/>
-      </dsp:nvSpPr>
-      <dsp:spPr>
-        <a:xfrm rot="10754228">
-          <a:off x="3579297" y="3343128"/>
-          <a:ext cx="817684" cy="0"/>
-        </a:xfrm>
-        <a:custGeom>
-          <a:avLst/>
-          <a:gdLst/>
-          <a:ahLst/>
-          <a:cxnLst/>
-          <a:rect l="0" t="0" r="0" b="0"/>
-          <a:pathLst>
-            <a:path>
-              <a:moveTo>
-                <a:pt x="0" y="0"/>
-              </a:moveTo>
-              <a:lnTo>
-                <a:pt x="817684" y="0"/>
-              </a:lnTo>
-            </a:path>
-          </a:pathLst>
-        </a:custGeom>
-        <a:noFill/>
-        <a:ln w="34925" cap="flat" cmpd="sng" algn="in">
-          <a:solidFill>
-            <a:schemeClr val="accent1">
-              <a:shade val="60000"/>
-              <a:hueOff val="0"/>
-              <a:satOff val="0"/>
-              <a:lumOff val="0"/>
-              <a:alphaOff val="0"/>
-            </a:schemeClr>
-          </a:solidFill>
-          <a:prstDash val="solid"/>
-        </a:ln>
-        <a:effectLst/>
-      </dsp:spPr>
-      <dsp:style>
-        <a:lnRef idx="2">
-          <a:scrgbClr r="0" g="0" b="0"/>
-        </a:lnRef>
-        <a:fillRef idx="0">
-          <a:scrgbClr r="0" g="0" b="0"/>
-        </a:fillRef>
-        <a:effectRef idx="0">
-          <a:scrgbClr r="0" g="0" b="0"/>
-        </a:effectRef>
-        <a:fontRef idx="minor"/>
-      </dsp:style>
-    </dsp:sp>
-    <dsp:sp modelId="{FF23012D-3DAD-4A0F-80DB-453F9B7C1F00}">
-      <dsp:nvSpPr>
-        <dsp:cNvPr id="0" name=""/>
-        <dsp:cNvSpPr/>
-      </dsp:nvSpPr>
-      <dsp:spPr>
-        <a:xfrm rot="346810">
-          <a:off x="5862559" y="3498113"/>
-          <a:ext cx="1902333" cy="0"/>
-        </a:xfrm>
-        <a:custGeom>
-          <a:avLst/>
-          <a:gdLst/>
-          <a:ahLst/>
-          <a:cxnLst/>
-          <a:rect l="0" t="0" r="0" b="0"/>
-          <a:pathLst>
-            <a:path>
-              <a:moveTo>
-                <a:pt x="0" y="0"/>
-              </a:moveTo>
-              <a:lnTo>
-                <a:pt x="1902333" y="0"/>
-              </a:lnTo>
-            </a:path>
-          </a:pathLst>
-        </a:custGeom>
-        <a:noFill/>
-        <a:ln w="34925" cap="flat" cmpd="sng" algn="in">
-          <a:solidFill>
-            <a:schemeClr val="accent1">
-              <a:shade val="60000"/>
-              <a:hueOff val="0"/>
-              <a:satOff val="0"/>
-              <a:lumOff val="0"/>
-              <a:alphaOff val="0"/>
-            </a:schemeClr>
-          </a:solidFill>
-          <a:prstDash val="solid"/>
-        </a:ln>
-        <a:effectLst/>
-      </dsp:spPr>
-      <dsp:style>
-        <a:lnRef idx="2">
-          <a:scrgbClr r="0" g="0" b="0"/>
-        </a:lnRef>
-        <a:fillRef idx="0">
-          <a:scrgbClr r="0" g="0" b="0"/>
-        </a:fillRef>
-        <a:effectRef idx="0">
-          <a:scrgbClr r="0" g="0" b="0"/>
-        </a:effectRef>
-        <a:fontRef idx="minor"/>
-      </dsp:style>
-    </dsp:sp>
-    <dsp:sp modelId="{8AEE6B4E-129C-41B7-8F80-40008E64EAB0}">
-      <dsp:nvSpPr>
-        <dsp:cNvPr id="0" name=""/>
-        <dsp:cNvSpPr/>
-      </dsp:nvSpPr>
-      <dsp:spPr>
-        <a:xfrm rot="19487971">
-          <a:off x="5711391" y="2317462"/>
-          <a:ext cx="1706267" cy="0"/>
-        </a:xfrm>
-        <a:custGeom>
-          <a:avLst/>
-          <a:gdLst/>
-          <a:ahLst/>
-          <a:cxnLst/>
-          <a:rect l="0" t="0" r="0" b="0"/>
-          <a:pathLst>
-            <a:path>
-              <a:moveTo>
-                <a:pt x="0" y="0"/>
-              </a:moveTo>
-              <a:lnTo>
-                <a:pt x="1706267" y="0"/>
-              </a:lnTo>
-            </a:path>
-          </a:pathLst>
-        </a:custGeom>
-        <a:noFill/>
-        <a:ln w="34925" cap="flat" cmpd="sng" algn="in">
-          <a:solidFill>
-            <a:schemeClr val="accent1">
-              <a:shade val="60000"/>
-              <a:hueOff val="0"/>
-              <a:satOff val="0"/>
-              <a:lumOff val="0"/>
-              <a:alphaOff val="0"/>
-            </a:schemeClr>
-          </a:solidFill>
-          <a:prstDash val="solid"/>
-        </a:ln>
-        <a:effectLst/>
-      </dsp:spPr>
-      <dsp:style>
-        <a:lnRef idx="2">
-          <a:scrgbClr r="0" g="0" b="0"/>
-        </a:lnRef>
-        <a:fillRef idx="0">
-          <a:scrgbClr r="0" g="0" b="0"/>
-        </a:fillRef>
-        <a:effectRef idx="0">
-          <a:scrgbClr r="0" g="0" b="0"/>
-        </a:effectRef>
-        <a:fontRef idx="minor"/>
-      </dsp:style>
-    </dsp:sp>
-    <dsp:sp modelId="{067B3650-17DC-4DA8-87EE-F1DFFB33C387}">
-      <dsp:nvSpPr>
-        <dsp:cNvPr id="0" name=""/>
-        <dsp:cNvSpPr/>
-      </dsp:nvSpPr>
-      <dsp:spPr>
-        <a:xfrm>
-          <a:off x="4396945" y="2592670"/>
-          <a:ext cx="1470449" cy="1470449"/>
-        </a:xfrm>
-        <a:prstGeom prst="roundRect">
-          <a:avLst/>
-        </a:prstGeom>
-        <a:solidFill>
-          <a:schemeClr val="accent1">
-            <a:hueOff val="0"/>
-            <a:satOff val="0"/>
-            <a:lumOff val="0"/>
-            <a:alphaOff val="0"/>
-          </a:schemeClr>
-        </a:solidFill>
-        <a:ln w="34925" cap="flat" cmpd="sng" algn="in">
-          <a:solidFill>
-            <a:schemeClr val="lt1">
-              <a:hueOff val="0"/>
-              <a:satOff val="0"/>
-              <a:lumOff val="0"/>
-              <a:alphaOff val="0"/>
-            </a:schemeClr>
-          </a:solidFill>
-          <a:prstDash val="solid"/>
-        </a:ln>
-        <a:effectLst/>
-      </dsp:spPr>
-      <dsp:style>
-        <a:lnRef idx="2">
-          <a:scrgbClr r="0" g="0" b="0"/>
-        </a:lnRef>
-        <a:fillRef idx="1">
-          <a:scrgbClr r="0" g="0" b="0"/>
-        </a:fillRef>
-        <a:effectRef idx="0">
-          <a:scrgbClr r="0" g="0" b="0"/>
-        </a:effectRef>
-        <a:fontRef idx="minor">
-          <a:schemeClr val="lt1"/>
-        </a:fontRef>
-      </dsp:style>
-      <dsp:txBody>
-        <a:bodyPr spcFirstLastPara="0" vert="horz" wrap="square" lIns="78740" tIns="78740" rIns="78740" bIns="78740" numCol="1" spcCol="1270" anchor="ctr" anchorCtr="0">
-          <a:noAutofit/>
-        </a:bodyPr>
-        <a:lstStyle/>
-        <a:p>
-          <a:pPr lvl="0" algn="ctr" defTabSz="1377950">
-            <a:lnSpc>
-              <a:spcPct val="90000"/>
-            </a:lnSpc>
-            <a:spcBef>
-              <a:spcPct val="0"/>
-            </a:spcBef>
-            <a:spcAft>
-              <a:spcPct val="35000"/>
-            </a:spcAft>
-          </a:pPr>
-          <a:r>
-            <a:rPr lang="sl-SI" sz="3100" kern="1200" dirty="0" smtClean="0"/>
-            <a:t>WAMP</a:t>
-          </a:r>
-          <a:br>
-            <a:rPr lang="sl-SI" sz="3100" kern="1200" dirty="0" smtClean="0"/>
-          </a:br>
-          <a:r>
-            <a:rPr lang="sl-SI" sz="3100" kern="1200" dirty="0" smtClean="0"/>
-            <a:t>Router</a:t>
-          </a:r>
-          <a:endParaRPr lang="sl-SI" sz="3100" kern="1200" dirty="0"/>
-        </a:p>
-      </dsp:txBody>
-      <dsp:txXfrm>
-        <a:off x="4468726" y="2664451"/>
-        <a:ext cx="1326887" cy="1326887"/>
-      </dsp:txXfrm>
-    </dsp:sp>
-    <dsp:sp modelId="{AB34DF75-6BED-4321-9EDA-4DBC8F284296}">
-      <dsp:nvSpPr>
-        <dsp:cNvPr id="0" name=""/>
-        <dsp:cNvSpPr/>
-      </dsp:nvSpPr>
-      <dsp:spPr>
-        <a:xfrm>
-          <a:off x="7261654" y="375115"/>
-          <a:ext cx="1701111" cy="1701111"/>
-        </a:xfrm>
-        <a:prstGeom prst="roundRect">
-          <a:avLst/>
-        </a:prstGeom>
-        <a:solidFill>
-          <a:schemeClr val="accent1">
-            <a:hueOff val="0"/>
-            <a:satOff val="0"/>
-            <a:lumOff val="0"/>
-            <a:alphaOff val="0"/>
-          </a:schemeClr>
-        </a:solidFill>
-        <a:ln w="34925" cap="flat" cmpd="sng" algn="in">
-          <a:solidFill>
-            <a:schemeClr val="lt1">
-              <a:hueOff val="0"/>
-              <a:satOff val="0"/>
-              <a:lumOff val="0"/>
-              <a:alphaOff val="0"/>
-            </a:schemeClr>
-          </a:solidFill>
-          <a:prstDash val="solid"/>
-        </a:ln>
-        <a:effectLst/>
-      </dsp:spPr>
-      <dsp:style>
-        <a:lnRef idx="2">
-          <a:scrgbClr r="0" g="0" b="0"/>
-        </a:lnRef>
-        <a:fillRef idx="1">
-          <a:scrgbClr r="0" g="0" b="0"/>
-        </a:fillRef>
-        <a:effectRef idx="0">
-          <a:scrgbClr r="0" g="0" b="0"/>
-        </a:effectRef>
-        <a:fontRef idx="minor">
-          <a:schemeClr val="lt1"/>
-        </a:fontRef>
-      </dsp:style>
-      <dsp:txBody>
-        <a:bodyPr spcFirstLastPara="0" vert="horz" wrap="square" lIns="60960" tIns="60960" rIns="60960" bIns="60960" numCol="1" spcCol="1270" anchor="ctr" anchorCtr="0">
-          <a:noAutofit/>
-        </a:bodyPr>
-        <a:lstStyle/>
-        <a:p>
-          <a:pPr lvl="0" algn="ctr" defTabSz="1066800">
-            <a:lnSpc>
-              <a:spcPct val="90000"/>
-            </a:lnSpc>
-            <a:spcBef>
-              <a:spcPct val="0"/>
-            </a:spcBef>
-            <a:spcAft>
-              <a:spcPct val="35000"/>
-            </a:spcAft>
-          </a:pPr>
-          <a:r>
-            <a:rPr lang="sl-SI" sz="2400" kern="1200" dirty="0" smtClean="0"/>
-            <a:t>Spletni</a:t>
-          </a:r>
-          <a:br>
-            <a:rPr lang="sl-SI" sz="2400" kern="1200" dirty="0" smtClean="0"/>
-          </a:br>
-          <a:r>
-            <a:rPr lang="sl-SI" sz="2400" kern="1200" dirty="0" smtClean="0"/>
-            <a:t>brskalnik</a:t>
-          </a:r>
-        </a:p>
-        <a:p>
-          <a:pPr lvl="0" algn="ctr" defTabSz="1066800">
-            <a:lnSpc>
-              <a:spcPct val="90000"/>
-            </a:lnSpc>
-            <a:spcBef>
-              <a:spcPct val="0"/>
-            </a:spcBef>
-            <a:spcAft>
-              <a:spcPct val="35000"/>
-            </a:spcAft>
-          </a:pPr>
-          <a:r>
-            <a:rPr lang="sl-SI" sz="2400" kern="1200" dirty="0" smtClean="0"/>
-            <a:t>1</a:t>
-          </a:r>
-        </a:p>
-      </dsp:txBody>
-      <dsp:txXfrm>
-        <a:off x="7344695" y="458156"/>
-        <a:ext cx="1535029" cy="1535029"/>
-      </dsp:txXfrm>
-    </dsp:sp>
-    <dsp:sp modelId="{4D11BF85-DD33-4914-B9A0-CB1332762925}">
-      <dsp:nvSpPr>
-        <dsp:cNvPr id="0" name=""/>
-        <dsp:cNvSpPr/>
-      </dsp:nvSpPr>
-      <dsp:spPr>
-        <a:xfrm>
-          <a:off x="7760056" y="2829450"/>
-          <a:ext cx="1701111" cy="1701111"/>
-        </a:xfrm>
-        <a:prstGeom prst="roundRect">
-          <a:avLst/>
-        </a:prstGeom>
-        <a:solidFill>
-          <a:schemeClr val="accent1">
-            <a:hueOff val="0"/>
-            <a:satOff val="0"/>
-            <a:lumOff val="0"/>
-            <a:alphaOff val="0"/>
-          </a:schemeClr>
-        </a:solidFill>
-        <a:ln w="34925" cap="flat" cmpd="sng" algn="in">
-          <a:solidFill>
-            <a:schemeClr val="lt1">
-              <a:hueOff val="0"/>
-              <a:satOff val="0"/>
-              <a:lumOff val="0"/>
-              <a:alphaOff val="0"/>
-            </a:schemeClr>
-          </a:solidFill>
-          <a:prstDash val="solid"/>
-        </a:ln>
-        <a:effectLst/>
-      </dsp:spPr>
-      <dsp:style>
-        <a:lnRef idx="2">
-          <a:scrgbClr r="0" g="0" b="0"/>
-        </a:lnRef>
-        <a:fillRef idx="1">
-          <a:scrgbClr r="0" g="0" b="0"/>
-        </a:fillRef>
-        <a:effectRef idx="0">
-          <a:scrgbClr r="0" g="0" b="0"/>
-        </a:effectRef>
-        <a:fontRef idx="minor">
-          <a:schemeClr val="lt1"/>
-        </a:fontRef>
-      </dsp:style>
-      <dsp:txBody>
-        <a:bodyPr spcFirstLastPara="0" vert="horz" wrap="square" lIns="71120" tIns="71120" rIns="71120" bIns="71120" numCol="1" spcCol="1270" anchor="ctr" anchorCtr="0">
-          <a:noAutofit/>
-        </a:bodyPr>
-        <a:lstStyle/>
-        <a:p>
-          <a:pPr lvl="0" algn="ctr" defTabSz="1244600">
-            <a:lnSpc>
-              <a:spcPct val="90000"/>
-            </a:lnSpc>
-            <a:spcBef>
-              <a:spcPct val="0"/>
-            </a:spcBef>
-            <a:spcAft>
-              <a:spcPct val="35000"/>
-            </a:spcAft>
-          </a:pPr>
-          <a:r>
-            <a:rPr lang="sl-SI" sz="2800" kern="1200" dirty="0" smtClean="0"/>
-            <a:t>Spletni</a:t>
-          </a:r>
-          <a:br>
-            <a:rPr lang="sl-SI" sz="2800" kern="1200" dirty="0" smtClean="0"/>
-          </a:br>
-          <a:r>
-            <a:rPr lang="sl-SI" sz="2800" kern="1200" dirty="0" smtClean="0"/>
-            <a:t>brskalnik</a:t>
-          </a:r>
-        </a:p>
-        <a:p>
-          <a:pPr lvl="0" algn="ctr" defTabSz="1244600">
-            <a:lnSpc>
-              <a:spcPct val="90000"/>
-            </a:lnSpc>
-            <a:spcBef>
-              <a:spcPct val="0"/>
-            </a:spcBef>
-            <a:spcAft>
-              <a:spcPct val="35000"/>
-            </a:spcAft>
-          </a:pPr>
-          <a:r>
-            <a:rPr lang="sl-SI" sz="2800" kern="1200" dirty="0" smtClean="0"/>
-            <a:t>2</a:t>
-          </a:r>
-        </a:p>
-      </dsp:txBody>
-      <dsp:txXfrm>
-        <a:off x="7843097" y="2912491"/>
-        <a:ext cx="1535029" cy="1535029"/>
-      </dsp:txXfrm>
-    </dsp:sp>
-    <dsp:sp modelId="{6C689A34-C942-438E-9598-2F573BB43A0E}">
-      <dsp:nvSpPr>
-        <dsp:cNvPr id="0" name=""/>
-        <dsp:cNvSpPr/>
-      </dsp:nvSpPr>
-      <dsp:spPr>
-        <a:xfrm>
-          <a:off x="1864346" y="2502495"/>
-          <a:ext cx="1714986" cy="1714986"/>
-        </a:xfrm>
-        <a:prstGeom prst="roundRect">
-          <a:avLst/>
-        </a:prstGeom>
-        <a:solidFill>
-          <a:schemeClr val="accent1">
-            <a:hueOff val="0"/>
-            <a:satOff val="0"/>
-            <a:lumOff val="0"/>
-            <a:alphaOff val="0"/>
-          </a:schemeClr>
-        </a:solidFill>
-        <a:ln w="34925" cap="flat" cmpd="sng" algn="in">
-          <a:solidFill>
-            <a:schemeClr val="lt1">
-              <a:hueOff val="0"/>
-              <a:satOff val="0"/>
-              <a:lumOff val="0"/>
-              <a:alphaOff val="0"/>
-            </a:schemeClr>
-          </a:solidFill>
-          <a:prstDash val="solid"/>
-        </a:ln>
-        <a:effectLst/>
-      </dsp:spPr>
-      <dsp:style>
-        <a:lnRef idx="2">
-          <a:scrgbClr r="0" g="0" b="0"/>
-        </a:lnRef>
-        <a:fillRef idx="1">
-          <a:scrgbClr r="0" g="0" b="0"/>
-        </a:fillRef>
-        <a:effectRef idx="0">
-          <a:scrgbClr r="0" g="0" b="0"/>
-        </a:effectRef>
-        <a:fontRef idx="minor">
-          <a:schemeClr val="lt1"/>
-        </a:fontRef>
-      </dsp:style>
-      <dsp:txBody>
-        <a:bodyPr spcFirstLastPara="0" vert="horz" wrap="square" lIns="76200" tIns="76200" rIns="76200" bIns="76200" numCol="1" spcCol="1270" anchor="ctr" anchorCtr="0">
-          <a:noAutofit/>
-        </a:bodyPr>
-        <a:lstStyle/>
-        <a:p>
-          <a:pPr lvl="0" algn="ctr" defTabSz="1333500">
-            <a:lnSpc>
-              <a:spcPct val="90000"/>
-            </a:lnSpc>
-            <a:spcBef>
-              <a:spcPct val="0"/>
-            </a:spcBef>
-            <a:spcAft>
-              <a:spcPct val="35000"/>
-            </a:spcAft>
-          </a:pPr>
-          <a:r>
-            <a:rPr lang="sl-SI" sz="3000" kern="1200" dirty="0" smtClean="0"/>
-            <a:t>Python backend</a:t>
-          </a:r>
-          <a:endParaRPr lang="sl-SI" sz="3000" kern="1200" dirty="0"/>
-        </a:p>
-      </dsp:txBody>
-      <dsp:txXfrm>
-        <a:off x="1948065" y="2586214"/>
-        <a:ext cx="1547548" cy="1547548"/>
-      </dsp:txXfrm>
-    </dsp:sp>
-    <dsp:sp modelId="{00A35B42-AA61-4236-A1D7-F917ECE0B667}">
-      <dsp:nvSpPr>
-        <dsp:cNvPr id="0" name=""/>
-        <dsp:cNvSpPr/>
-      </dsp:nvSpPr>
-      <dsp:spPr>
-        <a:xfrm rot="16327396">
-          <a:off x="2577518" y="2319732"/>
-          <a:ext cx="365777" cy="0"/>
-        </a:xfrm>
-        <a:custGeom>
-          <a:avLst/>
-          <a:gdLst/>
-          <a:ahLst/>
-          <a:cxnLst/>
-          <a:rect l="0" t="0" r="0" b="0"/>
-          <a:pathLst>
-            <a:path>
-              <a:moveTo>
-                <a:pt x="0" y="0"/>
-              </a:moveTo>
-              <a:lnTo>
-                <a:pt x="365777" y="0"/>
-              </a:lnTo>
-            </a:path>
-          </a:pathLst>
-        </a:custGeom>
-        <a:noFill/>
-        <a:ln w="34925" cap="flat" cmpd="sng" algn="in">
-          <a:solidFill>
-            <a:schemeClr val="accent1">
-              <a:shade val="80000"/>
-              <a:hueOff val="0"/>
-              <a:satOff val="0"/>
-              <a:lumOff val="0"/>
-              <a:alphaOff val="0"/>
-            </a:schemeClr>
-          </a:solidFill>
-          <a:prstDash val="solid"/>
-        </a:ln>
-        <a:effectLst/>
-      </dsp:spPr>
-      <dsp:style>
-        <a:lnRef idx="2">
-          <a:scrgbClr r="0" g="0" b="0"/>
-        </a:lnRef>
-        <a:fillRef idx="0">
-          <a:scrgbClr r="0" g="0" b="0"/>
-        </a:fillRef>
-        <a:effectRef idx="0">
-          <a:scrgbClr r="0" g="0" b="0"/>
-        </a:effectRef>
-        <a:fontRef idx="minor"/>
-      </dsp:style>
-    </dsp:sp>
-    <dsp:sp modelId="{B6001E08-CF80-4CF9-9937-BE132BB0E3A7}">
-      <dsp:nvSpPr>
-        <dsp:cNvPr id="0" name=""/>
-        <dsp:cNvSpPr/>
-      </dsp:nvSpPr>
-      <dsp:spPr>
-        <a:xfrm>
-          <a:off x="1836140" y="312492"/>
-          <a:ext cx="1929728" cy="1824476"/>
-        </a:xfrm>
-        <a:prstGeom prst="roundRect">
-          <a:avLst/>
-        </a:prstGeom>
-        <a:solidFill>
-          <a:schemeClr val="accent1">
-            <a:hueOff val="0"/>
-            <a:satOff val="0"/>
-            <a:lumOff val="0"/>
-            <a:alphaOff val="0"/>
-          </a:schemeClr>
-        </a:solidFill>
-        <a:ln w="34925" cap="flat" cmpd="sng" algn="in">
-          <a:solidFill>
-            <a:schemeClr val="lt1">
-              <a:hueOff val="0"/>
-              <a:satOff val="0"/>
-              <a:lumOff val="0"/>
-              <a:alphaOff val="0"/>
-            </a:schemeClr>
-          </a:solidFill>
-          <a:prstDash val="solid"/>
-        </a:ln>
-        <a:effectLst/>
-      </dsp:spPr>
-      <dsp:style>
-        <a:lnRef idx="2">
-          <a:scrgbClr r="0" g="0" b="0"/>
-        </a:lnRef>
-        <a:fillRef idx="1">
-          <a:scrgbClr r="0" g="0" b="0"/>
-        </a:fillRef>
-        <a:effectRef idx="0">
-          <a:scrgbClr r="0" g="0" b="0"/>
-        </a:effectRef>
-        <a:fontRef idx="minor">
-          <a:schemeClr val="lt1"/>
-        </a:fontRef>
-      </dsp:style>
-      <dsp:txBody>
-        <a:bodyPr spcFirstLastPara="0" vert="horz" wrap="square" lIns="132080" tIns="132080" rIns="132080" bIns="132080" numCol="1" spcCol="1270" anchor="ctr" anchorCtr="0">
-          <a:noAutofit/>
-        </a:bodyPr>
-        <a:lstStyle/>
-        <a:p>
-          <a:pPr lvl="0" algn="ctr" defTabSz="2311400">
-            <a:lnSpc>
-              <a:spcPct val="90000"/>
-            </a:lnSpc>
-            <a:spcBef>
-              <a:spcPct val="0"/>
-            </a:spcBef>
-            <a:spcAft>
-              <a:spcPct val="35000"/>
-            </a:spcAft>
-          </a:pPr>
-          <a:r>
-            <a:rPr lang="sl-SI" sz="5200" kern="1200" dirty="0" smtClean="0"/>
-            <a:t>SQL baza</a:t>
-          </a:r>
-          <a:endParaRPr lang="sl-SI" sz="5200" kern="1200" dirty="0"/>
-        </a:p>
-      </dsp:txBody>
-      <dsp:txXfrm>
-        <a:off x="1925204" y="401556"/>
-        <a:ext cx="1751600" cy="1646348"/>
-      </dsp:txXfrm>
-    </dsp:sp>
   </dsp:spTree>
 </dsp:drawing>
 </file>
@@ -10390,7 +9733,11 @@
           <a:p>
             <a:r>
               <a:rPr lang="sl-SI" dirty="0" smtClean="0"/>
-              <a:t>Trenutni izdelek</a:t>
+              <a:t>Trenutni </a:t>
+            </a:r>
+            <a:r>
+              <a:rPr lang="sl-SI" dirty="0" smtClean="0"/>
+              <a:t>izdelek - backend</a:t>
             </a:r>
             <a:endParaRPr lang="sl-SI" dirty="0"/>
           </a:p>
@@ -10440,23 +9787,17 @@
           <a:p>
             <a:r>
               <a:rPr lang="sl-SI" dirty="0" smtClean="0"/>
-              <a:t>Postavljen spletni strežnik oz. HTTP </a:t>
+              <a:t>Postavljen spletni strežnik oz. HTTP strežnik </a:t>
+            </a:r>
+          </a:p>
+          <a:p>
+            <a:r>
+              <a:rPr lang="sl-SI" dirty="0" smtClean="0"/>
+              <a:t>Registracija </a:t>
             </a:r>
             <a:r>
               <a:rPr lang="sl-SI" dirty="0" smtClean="0"/>
-              <a:t>strežnik </a:t>
-            </a:r>
-          </a:p>
-          <a:p>
-            <a:r>
-              <a:rPr lang="sl-SI" smtClean="0"/>
-              <a:t>HTML datoteka (uporaba Bootstrapa)</a:t>
-            </a:r>
-          </a:p>
-          <a:p>
-            <a:r>
-              <a:rPr lang="sl-SI" dirty="0" smtClean="0"/>
-              <a:t>Registracija in prijava že delujeta</a:t>
+              <a:t>in prijava že delujeta</a:t>
             </a:r>
           </a:p>
           <a:p>
@@ -10476,36 +9817,6 @@
           </a:p>
         </p:txBody>
       </p:sp>
-      <p:pic>
-        <p:nvPicPr>
-          <p:cNvPr id="4" name="Picture 3"/>
-          <p:cNvPicPr>
-            <a:picLocks noChangeAspect="1"/>
-          </p:cNvPicPr>
-          <p:nvPr/>
-        </p:nvPicPr>
-        <p:blipFill>
-          <a:blip r:embed="rId3">
-            <a:extLst>
-              <a:ext uri="{28A0092B-C50C-407E-A947-70E740481C1C}">
-                <a14:useLocalDpi xmlns:a14="http://schemas.microsoft.com/office/drawing/2010/main" val="0"/>
-              </a:ext>
-            </a:extLst>
-          </a:blip>
-          <a:stretch>
-            <a:fillRect/>
-          </a:stretch>
-        </p:blipFill>
-        <p:spPr>
-          <a:xfrm>
-            <a:off x="8150851" y="3545983"/>
-            <a:ext cx="2381250" cy="1981200"/>
-          </a:xfrm>
-          <a:prstGeom prst="rect">
-            <a:avLst/>
-          </a:prstGeom>
-        </p:spPr>
-      </p:pic>
     </p:spTree>
     <p:extLst>
       <p:ext uri="{BB962C8B-B14F-4D97-AF65-F5344CB8AC3E}">
@@ -10520,6 +9831,141 @@
 </file>
 
 <file path=ppt/slides/slide6.xml><?xml version="1.0" encoding="utf-8"?>
+<p:sld xmlns:a="http://schemas.openxmlformats.org/drawingml/2006/main" xmlns:r="http://schemas.openxmlformats.org/officeDocument/2006/relationships" xmlns:p="http://schemas.openxmlformats.org/presentationml/2006/main">
+  <p:cSld>
+    <p:spTree>
+      <p:nvGrpSpPr>
+        <p:cNvPr id="1" name=""/>
+        <p:cNvGrpSpPr/>
+        <p:nvPr/>
+      </p:nvGrpSpPr>
+      <p:grpSpPr>
+        <a:xfrm>
+          <a:off x="0" y="0"/>
+          <a:ext cx="0" cy="0"/>
+          <a:chOff x="0" y="0"/>
+          <a:chExt cx="0" cy="0"/>
+        </a:xfrm>
+      </p:grpSpPr>
+      <p:sp>
+        <p:nvSpPr>
+          <p:cNvPr id="2" name="Title 1"/>
+          <p:cNvSpPr>
+            <a:spLocks noGrp="1"/>
+          </p:cNvSpPr>
+          <p:nvPr>
+            <p:ph type="title"/>
+          </p:nvPr>
+        </p:nvSpPr>
+        <p:spPr>
+          <a:xfrm>
+            <a:off x="1371600" y="685800"/>
+            <a:ext cx="9601200" cy="1117242"/>
+          </a:xfrm>
+        </p:spPr>
+        <p:txBody>
+          <a:bodyPr/>
+          <a:lstStyle/>
+          <a:p>
+            <a:r>
+              <a:rPr lang="sl-SI" dirty="0"/>
+              <a:t>Trenutni izdelek - </a:t>
+            </a:r>
+            <a:r>
+              <a:rPr lang="sl-SI" dirty="0" smtClean="0"/>
+              <a:t>frontend</a:t>
+            </a:r>
+            <a:endParaRPr lang="sl-SI" dirty="0"/>
+          </a:p>
+        </p:txBody>
+      </p:sp>
+      <p:sp>
+        <p:nvSpPr>
+          <p:cNvPr id="3" name="Content Placeholder 2"/>
+          <p:cNvSpPr>
+            <a:spLocks noGrp="1"/>
+          </p:cNvSpPr>
+          <p:nvPr>
+            <p:ph idx="1"/>
+          </p:nvPr>
+        </p:nvSpPr>
+        <p:spPr>
+          <a:xfrm>
+            <a:off x="1371600" y="1803042"/>
+            <a:ext cx="9601200" cy="4064358"/>
+          </a:xfrm>
+        </p:spPr>
+        <p:txBody>
+          <a:bodyPr/>
+          <a:lstStyle/>
+          <a:p>
+            <a:r>
+              <a:rPr lang="sl-SI" dirty="0"/>
+              <a:t>HTML </a:t>
+            </a:r>
+            <a:r>
+              <a:rPr lang="sl-SI" dirty="0" smtClean="0"/>
+              <a:t>datoteka</a:t>
+            </a:r>
+          </a:p>
+          <a:p>
+            <a:r>
+              <a:rPr lang="sl-SI" dirty="0" smtClean="0"/>
+              <a:t>Uporaba Bootstrapa</a:t>
+            </a:r>
+          </a:p>
+          <a:p>
+            <a:pPr marL="0" indent="0">
+              <a:buNone/>
+            </a:pPr>
+            <a:endParaRPr lang="sl-SI" dirty="0"/>
+          </a:p>
+        </p:txBody>
+      </p:sp>
+      <p:pic>
+        <p:nvPicPr>
+          <p:cNvPr id="4" name="Picture 3"/>
+          <p:cNvPicPr>
+            <a:picLocks noChangeAspect="1"/>
+          </p:cNvPicPr>
+          <p:nvPr/>
+        </p:nvPicPr>
+        <p:blipFill>
+          <a:blip r:embed="rId2">
+            <a:extLst>
+              <a:ext uri="{28A0092B-C50C-407E-A947-70E740481C1C}">
+                <a14:useLocalDpi xmlns:a14="http://schemas.microsoft.com/office/drawing/2010/main" val="0"/>
+              </a:ext>
+            </a:extLst>
+          </a:blip>
+          <a:stretch>
+            <a:fillRect/>
+          </a:stretch>
+        </p:blipFill>
+        <p:spPr>
+          <a:xfrm>
+            <a:off x="7545544" y="2286000"/>
+            <a:ext cx="2381250" cy="1981200"/>
+          </a:xfrm>
+          <a:prstGeom prst="rect">
+            <a:avLst/>
+          </a:prstGeom>
+        </p:spPr>
+      </p:pic>
+    </p:spTree>
+    <p:extLst>
+      <p:ext uri="{BB962C8B-B14F-4D97-AF65-F5344CB8AC3E}">
+        <p14:creationId xmlns:p14="http://schemas.microsoft.com/office/powerpoint/2010/main" val="3674799839"/>
+      </p:ext>
+    </p:extLst>
+  </p:cSld>
+  <p:clrMapOvr>
+    <a:masterClrMapping/>
+  </p:clrMapOvr>
+</p:sld>
+</file>
+
+<file path=ppt/slides/slide7.xml><?xml version="1.0" encoding="utf-8"?>
 <p:sld xmlns:a="http://schemas.openxmlformats.org/drawingml/2006/main" xmlns:r="http://schemas.openxmlformats.org/officeDocument/2006/relationships" xmlns:p="http://schemas.openxmlformats.org/presentationml/2006/main">
   <p:cSld>
     <p:spTree>

</xml_diff>